<commit_message>
Fix zorder of Figure 1 (#73)
* fix zorder

* fix utd number positions
</commit_message>
<xml_diff>
--- a/analysis/figure/compute_vs_performance.pptx
+++ b/analysis/figure/compute_vs_performance.pptx
@@ -5,7 +5,7 @@
     <p:sldMasterId id="2147483828" r:id="rId1"/>
   </p:sldMasterIdLst>
   <p:sldIdLst>
-    <p:sldId id="256" r:id="rId2"/>
+    <p:sldId id="257" r:id="rId2"/>
   </p:sldIdLst>
   <p:sldSz cx="3719513" cy="2232025"/>
   <p:notesSz cx="6858000" cy="9144000"/>
@@ -254,7 +254,7 @@
           <a:p>
             <a:fld id="{F464B299-6CB9-D24A-96F2-2CC94620154A}" type="datetimeFigureOut">
               <a:rPr kumimoji="1" lang="ko-Kore-KR" altLang="en-US" smtClean="0"/>
-              <a:t>2025. 2. 11.</a:t>
+              <a:t>2/20/25</a:t>
             </a:fld>
             <a:endParaRPr kumimoji="1" lang="ko-Kore-KR" altLang="en-US"/>
           </a:p>
@@ -424,7 +424,7 @@
           <a:p>
             <a:fld id="{F464B299-6CB9-D24A-96F2-2CC94620154A}" type="datetimeFigureOut">
               <a:rPr kumimoji="1" lang="ko-Kore-KR" altLang="en-US" smtClean="0"/>
-              <a:t>2025. 2. 11.</a:t>
+              <a:t>2/20/25</a:t>
             </a:fld>
             <a:endParaRPr kumimoji="1" lang="ko-Kore-KR" altLang="en-US"/>
           </a:p>
@@ -604,7 +604,7 @@
           <a:p>
             <a:fld id="{F464B299-6CB9-D24A-96F2-2CC94620154A}" type="datetimeFigureOut">
               <a:rPr kumimoji="1" lang="ko-Kore-KR" altLang="en-US" smtClean="0"/>
-              <a:t>2025. 2. 11.</a:t>
+              <a:t>2/20/25</a:t>
             </a:fld>
             <a:endParaRPr kumimoji="1" lang="ko-Kore-KR" altLang="en-US"/>
           </a:p>
@@ -774,7 +774,7 @@
           <a:p>
             <a:fld id="{F464B299-6CB9-D24A-96F2-2CC94620154A}" type="datetimeFigureOut">
               <a:rPr kumimoji="1" lang="ko-Kore-KR" altLang="en-US" smtClean="0"/>
-              <a:t>2025. 2. 11.</a:t>
+              <a:t>2/20/25</a:t>
             </a:fld>
             <a:endParaRPr kumimoji="1" lang="ko-Kore-KR" altLang="en-US"/>
           </a:p>
@@ -1020,7 +1020,7 @@
           <a:p>
             <a:fld id="{F464B299-6CB9-D24A-96F2-2CC94620154A}" type="datetimeFigureOut">
               <a:rPr kumimoji="1" lang="ko-Kore-KR" altLang="en-US" smtClean="0"/>
-              <a:t>2025. 2. 11.</a:t>
+              <a:t>2/20/25</a:t>
             </a:fld>
             <a:endParaRPr kumimoji="1" lang="ko-Kore-KR" altLang="en-US"/>
           </a:p>
@@ -1252,7 +1252,7 @@
           <a:p>
             <a:fld id="{F464B299-6CB9-D24A-96F2-2CC94620154A}" type="datetimeFigureOut">
               <a:rPr kumimoji="1" lang="ko-Kore-KR" altLang="en-US" smtClean="0"/>
-              <a:t>2025. 2. 11.</a:t>
+              <a:t>2/20/25</a:t>
             </a:fld>
             <a:endParaRPr kumimoji="1" lang="ko-Kore-KR" altLang="en-US"/>
           </a:p>
@@ -1619,7 +1619,7 @@
           <a:p>
             <a:fld id="{F464B299-6CB9-D24A-96F2-2CC94620154A}" type="datetimeFigureOut">
               <a:rPr kumimoji="1" lang="ko-Kore-KR" altLang="en-US" smtClean="0"/>
-              <a:t>2025. 2. 11.</a:t>
+              <a:t>2/20/25</a:t>
             </a:fld>
             <a:endParaRPr kumimoji="1" lang="ko-Kore-KR" altLang="en-US"/>
           </a:p>
@@ -1737,7 +1737,7 @@
           <a:p>
             <a:fld id="{F464B299-6CB9-D24A-96F2-2CC94620154A}" type="datetimeFigureOut">
               <a:rPr kumimoji="1" lang="ko-Kore-KR" altLang="en-US" smtClean="0"/>
-              <a:t>2025. 2. 11.</a:t>
+              <a:t>2/20/25</a:t>
             </a:fld>
             <a:endParaRPr kumimoji="1" lang="ko-Kore-KR" altLang="en-US"/>
           </a:p>
@@ -1832,7 +1832,7 @@
           <a:p>
             <a:fld id="{F464B299-6CB9-D24A-96F2-2CC94620154A}" type="datetimeFigureOut">
               <a:rPr kumimoji="1" lang="ko-Kore-KR" altLang="en-US" smtClean="0"/>
-              <a:t>2025. 2. 11.</a:t>
+              <a:t>2/20/25</a:t>
             </a:fld>
             <a:endParaRPr kumimoji="1" lang="ko-Kore-KR" altLang="en-US"/>
           </a:p>
@@ -2109,7 +2109,7 @@
           <a:p>
             <a:fld id="{F464B299-6CB9-D24A-96F2-2CC94620154A}" type="datetimeFigureOut">
               <a:rPr kumimoji="1" lang="ko-Kore-KR" altLang="en-US" smtClean="0"/>
-              <a:t>2025. 2. 11.</a:t>
+              <a:t>2/20/25</a:t>
             </a:fld>
             <a:endParaRPr kumimoji="1" lang="ko-Kore-KR" altLang="en-US"/>
           </a:p>
@@ -2366,7 +2366,7 @@
           <a:p>
             <a:fld id="{F464B299-6CB9-D24A-96F2-2CC94620154A}" type="datetimeFigureOut">
               <a:rPr kumimoji="1" lang="ko-Kore-KR" altLang="en-US" smtClean="0"/>
-              <a:t>2025. 2. 11.</a:t>
+              <a:t>2/20/25</a:t>
             </a:fld>
             <a:endParaRPr kumimoji="1" lang="ko-Kore-KR" altLang="en-US"/>
           </a:p>
@@ -2579,7 +2579,7 @@
           <a:p>
             <a:fld id="{F464B299-6CB9-D24A-96F2-2CC94620154A}" type="datetimeFigureOut">
               <a:rPr kumimoji="1" lang="ko-Kore-KR" altLang="en-US" smtClean="0"/>
-              <a:t>2025. 2. 11.</a:t>
+              <a:t>2/20/25</a:t>
             </a:fld>
             <a:endParaRPr kumimoji="1" lang="ko-Kore-KR" altLang="en-US"/>
           </a:p>
@@ -2972,7 +2972,13 @@
   <p:cSld>
     <p:spTree>
       <p:nvGrpSpPr>
-        <p:cNvPr id="1" name=""/>
+        <p:cNvPr id="1" name="">
+          <a:extLst>
+            <a:ext uri="{FF2B5EF4-FFF2-40B4-BE49-F238E27FC236}">
+              <a16:creationId xmlns:a16="http://schemas.microsoft.com/office/drawing/2014/main" id="{C2726AE7-1F87-5971-2D1B-4461E09ECC42}"/>
+            </a:ext>
+          </a:extLst>
+        </p:cNvPr>
         <p:cNvGrpSpPr/>
         <p:nvPr/>
       </p:nvGrpSpPr>
@@ -2986,10 +2992,10 @@
       </p:grpSpPr>
       <p:pic>
         <p:nvPicPr>
-          <p:cNvPr id="26" name="그림 25">
+          <p:cNvPr id="4" name="Picture 3">
             <a:extLst>
               <a:ext uri="{FF2B5EF4-FFF2-40B4-BE49-F238E27FC236}">
-                <a16:creationId xmlns:a16="http://schemas.microsoft.com/office/drawing/2014/main" id="{0450383D-3847-0DCB-ACCA-1A6595AE0FFD}"/>
+                <a16:creationId xmlns:a16="http://schemas.microsoft.com/office/drawing/2014/main" id="{709D5FAB-0D2A-8C5F-A10A-FB3DF492F199}"/>
               </a:ext>
             </a:extLst>
           </p:cNvPr>
@@ -3000,54 +3006,25 @@
         </p:nvPicPr>
         <p:blipFill rotWithShape="1">
           <a:blip r:embed="rId2"/>
-          <a:srcRect l="1436" t="2834" r="2322" b="2443"/>
+          <a:srcRect l="1553" t="2973" r="2282" b="2890"/>
           <a:stretch/>
         </p:blipFill>
         <p:spPr>
           <a:xfrm>
-            <a:off x="-3647" y="3520"/>
-            <a:ext cx="3656733" cy="2228506"/>
+            <a:off x="0" y="1"/>
+            <a:ext cx="3682268" cy="2232024"/>
           </a:xfrm>
           <a:prstGeom prst="rect">
             <a:avLst/>
           </a:prstGeom>
         </p:spPr>
       </p:pic>
-      <p:pic>
-        <p:nvPicPr>
-          <p:cNvPr id="27" name="그림 26">
-            <a:extLst>
-              <a:ext uri="{FF2B5EF4-FFF2-40B4-BE49-F238E27FC236}">
-                <a16:creationId xmlns:a16="http://schemas.microsoft.com/office/drawing/2014/main" id="{235F62FF-9B5B-4015-AACD-E36259CF952D}"/>
-              </a:ext>
-            </a:extLst>
-          </p:cNvPr>
-          <p:cNvPicPr>
-            <a:picLocks noChangeAspect="1"/>
-          </p:cNvPicPr>
-          <p:nvPr/>
-        </p:nvPicPr>
-        <p:blipFill rotWithShape="1">
-          <a:blip r:embed="rId2"/>
-          <a:srcRect l="1532" t="2834" r="2322" b="2443"/>
-          <a:stretch/>
-        </p:blipFill>
-        <p:spPr>
-          <a:xfrm>
-            <a:off x="0" y="3519"/>
-            <a:ext cx="3653085" cy="2228506"/>
-          </a:xfrm>
-          <a:prstGeom prst="rect">
-            <a:avLst/>
-          </a:prstGeom>
-        </p:spPr>
-      </p:pic>
       <p:sp>
         <p:nvSpPr>
           <p:cNvPr id="12" name="TextBox 11">
             <a:extLst>
               <a:ext uri="{FF2B5EF4-FFF2-40B4-BE49-F238E27FC236}">
-                <a16:creationId xmlns:a16="http://schemas.microsoft.com/office/drawing/2014/main" id="{AF836F5E-FF18-7F98-7B31-DA733FE0AF60}"/>
+                <a16:creationId xmlns:a16="http://schemas.microsoft.com/office/drawing/2014/main" id="{FE635CC6-5245-5B2D-60EA-6C200A7F0DAF}"/>
               </a:ext>
             </a:extLst>
           </p:cNvPr>
@@ -3056,7 +3033,7 @@
         </p:nvSpPr>
         <p:spPr>
           <a:xfrm>
-            <a:off x="1583913" y="281180"/>
+            <a:off x="1587338" y="267480"/>
             <a:ext cx="247184" cy="238527"/>
           </a:xfrm>
           <a:prstGeom prst="rect">
@@ -3097,7 +3074,7 @@
           <p:cNvPr id="13" name="TextBox 12">
             <a:extLst>
               <a:ext uri="{FF2B5EF4-FFF2-40B4-BE49-F238E27FC236}">
-                <a16:creationId xmlns:a16="http://schemas.microsoft.com/office/drawing/2014/main" id="{ECA91BE2-4C05-B54A-F943-A34019EE49C7}"/>
+                <a16:creationId xmlns:a16="http://schemas.microsoft.com/office/drawing/2014/main" id="{9D736151-5D09-1D24-56CF-22B9DB3C01EB}"/>
               </a:ext>
             </a:extLst>
           </p:cNvPr>
@@ -3106,7 +3083,7 @@
         </p:nvSpPr>
         <p:spPr>
           <a:xfrm>
-            <a:off x="2523496" y="250321"/>
+            <a:off x="2547774" y="250354"/>
             <a:ext cx="247184" cy="238527"/>
           </a:xfrm>
           <a:prstGeom prst="rect">
@@ -3147,7 +3124,7 @@
           <p:cNvPr id="14" name="TextBox 13">
             <a:extLst>
               <a:ext uri="{FF2B5EF4-FFF2-40B4-BE49-F238E27FC236}">
-                <a16:creationId xmlns:a16="http://schemas.microsoft.com/office/drawing/2014/main" id="{F3D21234-C61F-4202-9C7F-EE6B613D7DAC}"/>
+                <a16:creationId xmlns:a16="http://schemas.microsoft.com/office/drawing/2014/main" id="{A96EC4CA-FB8D-018E-3CDE-B2583EB5495E}"/>
               </a:ext>
             </a:extLst>
           </p:cNvPr>
@@ -3156,7 +3133,7 @@
         </p:nvSpPr>
         <p:spPr>
           <a:xfrm>
-            <a:off x="801981" y="546558"/>
+            <a:off x="815352" y="562210"/>
             <a:ext cx="247184" cy="238527"/>
           </a:xfrm>
           <a:prstGeom prst="rect">
@@ -3197,7 +3174,7 @@
           <p:cNvPr id="15" name="TextBox 14">
             <a:extLst>
               <a:ext uri="{FF2B5EF4-FFF2-40B4-BE49-F238E27FC236}">
-                <a16:creationId xmlns:a16="http://schemas.microsoft.com/office/drawing/2014/main" id="{11A212C0-0C70-B77A-71DE-5C96A34E0912}"/>
+                <a16:creationId xmlns:a16="http://schemas.microsoft.com/office/drawing/2014/main" id="{2BAE91CE-27F7-4FF8-F1D4-164C853DDBF0}"/>
               </a:ext>
             </a:extLst>
           </p:cNvPr>
@@ -3206,7 +3183,7 @@
         </p:nvSpPr>
         <p:spPr>
           <a:xfrm>
-            <a:off x="1062536" y="1148905"/>
+            <a:off x="1068870" y="1150362"/>
             <a:ext cx="247184" cy="238527"/>
           </a:xfrm>
           <a:prstGeom prst="rect">
@@ -3247,7 +3224,7 @@
           <p:cNvPr id="16" name="TextBox 15">
             <a:extLst>
               <a:ext uri="{FF2B5EF4-FFF2-40B4-BE49-F238E27FC236}">
-                <a16:creationId xmlns:a16="http://schemas.microsoft.com/office/drawing/2014/main" id="{8B7F30C7-2266-C2CF-1A58-C23BD7DD8CF4}"/>
+                <a16:creationId xmlns:a16="http://schemas.microsoft.com/office/drawing/2014/main" id="{74E35A41-97A7-165F-10F6-3EF85E6814C7}"/>
               </a:ext>
             </a:extLst>
           </p:cNvPr>
@@ -3256,7 +3233,7 @@
         </p:nvSpPr>
         <p:spPr>
           <a:xfrm>
-            <a:off x="3191201" y="765521"/>
+            <a:off x="3217716" y="762317"/>
             <a:ext cx="309700" cy="238527"/>
           </a:xfrm>
           <a:prstGeom prst="rect">
@@ -3297,7 +3274,7 @@
           <p:cNvPr id="17" name="TextBox 16">
             <a:extLst>
               <a:ext uri="{FF2B5EF4-FFF2-40B4-BE49-F238E27FC236}">
-                <a16:creationId xmlns:a16="http://schemas.microsoft.com/office/drawing/2014/main" id="{216F7322-7AFD-D695-92EE-807D52C8E520}"/>
+                <a16:creationId xmlns:a16="http://schemas.microsoft.com/office/drawing/2014/main" id="{BFC94F3A-D71B-C91A-610E-2786F62E1A28}"/>
               </a:ext>
             </a:extLst>
           </p:cNvPr>
@@ -3306,7 +3283,7 @@
         </p:nvSpPr>
         <p:spPr>
           <a:xfrm>
-            <a:off x="792718" y="975465"/>
+            <a:off x="815352" y="972740"/>
             <a:ext cx="247184" cy="238527"/>
           </a:xfrm>
           <a:prstGeom prst="rect">
@@ -3347,7 +3324,7 @@
           <p:cNvPr id="18" name="TextBox 17">
             <a:extLst>
               <a:ext uri="{FF2B5EF4-FFF2-40B4-BE49-F238E27FC236}">
-                <a16:creationId xmlns:a16="http://schemas.microsoft.com/office/drawing/2014/main" id="{8448D818-F065-1311-BCAF-468133BEA226}"/>
+                <a16:creationId xmlns:a16="http://schemas.microsoft.com/office/drawing/2014/main" id="{44ADA298-B381-2203-E571-749A57188DEA}"/>
               </a:ext>
             </a:extLst>
           </p:cNvPr>
@@ -3356,7 +3333,7 @@
         </p:nvSpPr>
         <p:spPr>
           <a:xfrm>
-            <a:off x="1078095" y="831405"/>
+            <a:off x="1091516" y="832861"/>
             <a:ext cx="247184" cy="238527"/>
           </a:xfrm>
           <a:prstGeom prst="rect">
@@ -3397,7 +3374,7 @@
           <p:cNvPr id="19" name="TextBox 18">
             <a:extLst>
               <a:ext uri="{FF2B5EF4-FFF2-40B4-BE49-F238E27FC236}">
-                <a16:creationId xmlns:a16="http://schemas.microsoft.com/office/drawing/2014/main" id="{A9AB7968-752E-27C3-0546-811C7AA7374B}"/>
+                <a16:creationId xmlns:a16="http://schemas.microsoft.com/office/drawing/2014/main" id="{DD2B1D7E-A811-0B94-DC76-F60AD44524B0}"/>
               </a:ext>
             </a:extLst>
           </p:cNvPr>
@@ -3406,7 +3383,7 @@
         </p:nvSpPr>
         <p:spPr>
           <a:xfrm>
-            <a:off x="1561654" y="749515"/>
+            <a:off x="1585436" y="737638"/>
             <a:ext cx="247184" cy="238527"/>
           </a:xfrm>
           <a:prstGeom prst="rect">
@@ -3447,7 +3424,7 @@
           <p:cNvPr id="20" name="TextBox 19">
             <a:extLst>
               <a:ext uri="{FF2B5EF4-FFF2-40B4-BE49-F238E27FC236}">
-                <a16:creationId xmlns:a16="http://schemas.microsoft.com/office/drawing/2014/main" id="{5B122059-1710-564E-3AB6-2B863B42CEB1}"/>
+                <a16:creationId xmlns:a16="http://schemas.microsoft.com/office/drawing/2014/main" id="{DCC2F426-FCA8-DA22-65B0-F887F237D2CB}"/>
               </a:ext>
             </a:extLst>
           </p:cNvPr>
@@ -3456,7 +3433,7 @@
         </p:nvSpPr>
         <p:spPr>
           <a:xfrm>
-            <a:off x="2527769" y="677494"/>
+            <a:off x="2547774" y="678048"/>
             <a:ext cx="247184" cy="238527"/>
           </a:xfrm>
           <a:prstGeom prst="rect">
@@ -3497,7 +3474,7 @@
           <p:cNvPr id="21" name="TextBox 20">
             <a:extLst>
               <a:ext uri="{FF2B5EF4-FFF2-40B4-BE49-F238E27FC236}">
-                <a16:creationId xmlns:a16="http://schemas.microsoft.com/office/drawing/2014/main" id="{AD70005F-C461-3830-854A-F4607D33E0BE}"/>
+                <a16:creationId xmlns:a16="http://schemas.microsoft.com/office/drawing/2014/main" id="{3B152F05-F6FE-AB8A-AF8B-2F63A01779F5}"/>
               </a:ext>
             </a:extLst>
           </p:cNvPr>
@@ -3547,7 +3524,7 @@
           <p:cNvPr id="22" name="TextBox 21">
             <a:extLst>
               <a:ext uri="{FF2B5EF4-FFF2-40B4-BE49-F238E27FC236}">
-                <a16:creationId xmlns:a16="http://schemas.microsoft.com/office/drawing/2014/main" id="{0962BF40-A25C-EDA4-3D99-41AA47B6B9DB}"/>
+                <a16:creationId xmlns:a16="http://schemas.microsoft.com/office/drawing/2014/main" id="{84361791-B40F-E5F3-554D-F02750216E8D}"/>
               </a:ext>
             </a:extLst>
           </p:cNvPr>
@@ -3556,7 +3533,7 @@
         </p:nvSpPr>
         <p:spPr>
           <a:xfrm>
-            <a:off x="1272857" y="1067963"/>
+            <a:off x="1279707" y="1067963"/>
             <a:ext cx="247184" cy="238527"/>
           </a:xfrm>
           <a:prstGeom prst="rect">
@@ -3597,7 +3574,7 @@
           <p:cNvPr id="5" name="TextBox 4">
             <a:extLst>
               <a:ext uri="{FF2B5EF4-FFF2-40B4-BE49-F238E27FC236}">
-                <a16:creationId xmlns:a16="http://schemas.microsoft.com/office/drawing/2014/main" id="{784408BC-F6C6-6F01-547B-9F24513A64C2}"/>
+                <a16:creationId xmlns:a16="http://schemas.microsoft.com/office/drawing/2014/main" id="{A301315F-41D7-147B-B0A4-6D029A6B2E8F}"/>
               </a:ext>
             </a:extLst>
           </p:cNvPr>
@@ -3606,7 +3583,7 @@
         </p:nvSpPr>
         <p:spPr>
           <a:xfrm>
-            <a:off x="1082368" y="309614"/>
+            <a:off x="1091516" y="302283"/>
             <a:ext cx="247184" cy="238527"/>
           </a:xfrm>
           <a:prstGeom prst="rect">
@@ -3645,7 +3622,7 @@
     </p:spTree>
     <p:extLst>
       <p:ext uri="{BB962C8B-B14F-4D97-AF65-F5344CB8AC3E}">
-        <p14:creationId xmlns:p14="http://schemas.microsoft.com/office/powerpoint/2010/main" val="3435040858"/>
+        <p14:creationId xmlns:p14="http://schemas.microsoft.com/office/powerpoint/2010/main" val="1147745468"/>
       </p:ext>
     </p:extLst>
   </p:cSld>

</xml_diff>